<commit_message>
m5 poster template tweaks
</commit_message>
<xml_diff>
--- a/public/assignments/poster-template-a-32x40.pptx
+++ b/public/assignments/poster-template-a-32x40.pptx
@@ -104,6 +104,11 @@
       </a:defRPr>
     </a:lvl9pPr>
   </p:defaultTextStyle>
+  <p:extLst>
+    <p:ext uri="{EFAFB233-063F-42B5-8137-9DF3F51BA10A}">
+      <p15:sldGuideLst xmlns:p15="http://schemas.microsoft.com/office/powerpoint/2012/main"/>
+    </p:ext>
+  </p:extLst>
 </p:presentation>
 </file>
 
@@ -238,7 +243,7 @@
           <a:p>
             <a:fld id="{C74D4ED2-8CCA-4146-B544-7DB418FDC672}" type="datetimeFigureOut">
               <a:rPr lang="en-US" smtClean="0"/>
-              <a:t>2/16/24</a:t>
+              <a:t>11/23/24</a:t>
             </a:fld>
             <a:endParaRPr lang="en-US"/>
           </a:p>
@@ -408,7 +413,7 @@
           <a:p>
             <a:fld id="{C74D4ED2-8CCA-4146-B544-7DB418FDC672}" type="datetimeFigureOut">
               <a:rPr lang="en-US" smtClean="0"/>
-              <a:t>2/16/24</a:t>
+              <a:t>11/23/24</a:t>
             </a:fld>
             <a:endParaRPr lang="en-US"/>
           </a:p>
@@ -588,7 +593,7 @@
           <a:p>
             <a:fld id="{C74D4ED2-8CCA-4146-B544-7DB418FDC672}" type="datetimeFigureOut">
               <a:rPr lang="en-US" smtClean="0"/>
-              <a:t>2/16/24</a:t>
+              <a:t>11/23/24</a:t>
             </a:fld>
             <a:endParaRPr lang="en-US"/>
           </a:p>
@@ -758,7 +763,7 @@
           <a:p>
             <a:fld id="{C74D4ED2-8CCA-4146-B544-7DB418FDC672}" type="datetimeFigureOut">
               <a:rPr lang="en-US" smtClean="0"/>
-              <a:t>2/16/24</a:t>
+              <a:t>11/23/24</a:t>
             </a:fld>
             <a:endParaRPr lang="en-US"/>
           </a:p>
@@ -1002,7 +1007,7 @@
           <a:p>
             <a:fld id="{C74D4ED2-8CCA-4146-B544-7DB418FDC672}" type="datetimeFigureOut">
               <a:rPr lang="en-US" smtClean="0"/>
-              <a:t>2/16/24</a:t>
+              <a:t>11/23/24</a:t>
             </a:fld>
             <a:endParaRPr lang="en-US"/>
           </a:p>
@@ -1234,7 +1239,7 @@
           <a:p>
             <a:fld id="{C74D4ED2-8CCA-4146-B544-7DB418FDC672}" type="datetimeFigureOut">
               <a:rPr lang="en-US" smtClean="0"/>
-              <a:t>2/16/24</a:t>
+              <a:t>11/23/24</a:t>
             </a:fld>
             <a:endParaRPr lang="en-US"/>
           </a:p>
@@ -1601,7 +1606,7 @@
           <a:p>
             <a:fld id="{C74D4ED2-8CCA-4146-B544-7DB418FDC672}" type="datetimeFigureOut">
               <a:rPr lang="en-US" smtClean="0"/>
-              <a:t>2/16/24</a:t>
+              <a:t>11/23/24</a:t>
             </a:fld>
             <a:endParaRPr lang="en-US"/>
           </a:p>
@@ -1719,7 +1724,7 @@
           <a:p>
             <a:fld id="{C74D4ED2-8CCA-4146-B544-7DB418FDC672}" type="datetimeFigureOut">
               <a:rPr lang="en-US" smtClean="0"/>
-              <a:t>2/16/24</a:t>
+              <a:t>11/23/24</a:t>
             </a:fld>
             <a:endParaRPr lang="en-US"/>
           </a:p>
@@ -1814,7 +1819,7 @@
           <a:p>
             <a:fld id="{C74D4ED2-8CCA-4146-B544-7DB418FDC672}" type="datetimeFigureOut">
               <a:rPr lang="en-US" smtClean="0"/>
-              <a:t>2/16/24</a:t>
+              <a:t>11/23/24</a:t>
             </a:fld>
             <a:endParaRPr lang="en-US"/>
           </a:p>
@@ -2091,7 +2096,7 @@
           <a:p>
             <a:fld id="{C74D4ED2-8CCA-4146-B544-7DB418FDC672}" type="datetimeFigureOut">
               <a:rPr lang="en-US" smtClean="0"/>
-              <a:t>2/16/24</a:t>
+              <a:t>11/23/24</a:t>
             </a:fld>
             <a:endParaRPr lang="en-US"/>
           </a:p>
@@ -2348,7 +2353,7 @@
           <a:p>
             <a:fld id="{C74D4ED2-8CCA-4146-B544-7DB418FDC672}" type="datetimeFigureOut">
               <a:rPr lang="en-US" smtClean="0"/>
-              <a:t>2/16/24</a:t>
+              <a:t>11/23/24</a:t>
             </a:fld>
             <a:endParaRPr lang="en-US"/>
           </a:p>
@@ -2561,7 +2566,7 @@
           <a:p>
             <a:fld id="{C74D4ED2-8CCA-4146-B544-7DB418FDC672}" type="datetimeFigureOut">
               <a:rPr lang="en-US" smtClean="0"/>
-              <a:t>2/16/24</a:t>
+              <a:t>11/23/24</a:t>
             </a:fld>
             <a:endParaRPr lang="en-US"/>
           </a:p>
@@ -3388,310 +3393,6 @@
       </p:sp>
       <p:sp>
         <p:nvSpPr>
-          <p:cNvPr id="50" name="object 46">
-            <a:extLst>
-              <a:ext uri="{FF2B5EF4-FFF2-40B4-BE49-F238E27FC236}">
-                <a16:creationId xmlns:a16="http://schemas.microsoft.com/office/drawing/2014/main" id="{441CF927-0346-215D-5BD8-A6647FA295AA}"/>
-              </a:ext>
-            </a:extLst>
-          </p:cNvPr>
-          <p:cNvSpPr/>
-          <p:nvPr/>
-        </p:nvSpPr>
-        <p:spPr>
-          <a:xfrm>
-            <a:off x="8838836" y="29183952"/>
-            <a:ext cx="1097932" cy="1017704"/>
-          </a:xfrm>
-          <a:custGeom>
-            <a:avLst/>
-            <a:gdLst/>
-            <a:ahLst/>
-            <a:cxnLst>
-              <a:cxn ang="0">
-                <a:pos x="wd2" y="hd2"/>
-              </a:cxn>
-              <a:cxn ang="5400000">
-                <a:pos x="wd2" y="hd2"/>
-              </a:cxn>
-              <a:cxn ang="10800000">
-                <a:pos x="wd2" y="hd2"/>
-              </a:cxn>
-              <a:cxn ang="16200000">
-                <a:pos x="wd2" y="hd2"/>
-              </a:cxn>
-            </a:cxnLst>
-            <a:rect l="0" t="0" r="r" b="b"/>
-            <a:pathLst>
-              <a:path w="21600" h="21600" extrusionOk="0">
-                <a:moveTo>
-                  <a:pt x="11042" y="0"/>
-                </a:moveTo>
-                <a:lnTo>
-                  <a:pt x="10804" y="0"/>
-                </a:lnTo>
-                <a:lnTo>
-                  <a:pt x="10450" y="35"/>
-                </a:lnTo>
-                <a:lnTo>
-                  <a:pt x="9358" y="697"/>
-                </a:lnTo>
-                <a:lnTo>
-                  <a:pt x="8996" y="1569"/>
-                </a:lnTo>
-                <a:lnTo>
-                  <a:pt x="8996" y="1806"/>
-                </a:lnTo>
-                <a:lnTo>
-                  <a:pt x="9526" y="3083"/>
-                </a:lnTo>
-                <a:lnTo>
-                  <a:pt x="15468" y="9000"/>
-                </a:lnTo>
-                <a:lnTo>
-                  <a:pt x="1801" y="9000"/>
-                </a:lnTo>
-                <a:lnTo>
-                  <a:pt x="527" y="9527"/>
-                </a:lnTo>
-                <a:lnTo>
-                  <a:pt x="0" y="10798"/>
-                </a:lnTo>
-                <a:lnTo>
-                  <a:pt x="35" y="11151"/>
-                </a:lnTo>
-                <a:lnTo>
-                  <a:pt x="802" y="12295"/>
-                </a:lnTo>
-                <a:lnTo>
-                  <a:pt x="1801" y="12597"/>
-                </a:lnTo>
-                <a:lnTo>
-                  <a:pt x="15468" y="12597"/>
-                </a:lnTo>
-                <a:lnTo>
-                  <a:pt x="9357" y="18681"/>
-                </a:lnTo>
-                <a:lnTo>
-                  <a:pt x="9223" y="18880"/>
-                </a:lnTo>
-                <a:lnTo>
-                  <a:pt x="9040" y="19319"/>
-                </a:lnTo>
-                <a:lnTo>
-                  <a:pt x="8993" y="19554"/>
-                </a:lnTo>
-                <a:lnTo>
-                  <a:pt x="8993" y="20028"/>
-                </a:lnTo>
-                <a:lnTo>
-                  <a:pt x="9693" y="21237"/>
-                </a:lnTo>
-                <a:lnTo>
-                  <a:pt x="10567" y="21600"/>
-                </a:lnTo>
-                <a:lnTo>
-                  <a:pt x="11042" y="21600"/>
-                </a:lnTo>
-                <a:lnTo>
-                  <a:pt x="21087" y="12075"/>
-                </a:lnTo>
-                <a:lnTo>
-                  <a:pt x="21600" y="10798"/>
-                </a:lnTo>
-                <a:lnTo>
-                  <a:pt x="21566" y="10452"/>
-                </a:lnTo>
-                <a:lnTo>
-                  <a:pt x="11915" y="361"/>
-                </a:lnTo>
-                <a:lnTo>
-                  <a:pt x="11277" y="47"/>
-                </a:lnTo>
-                <a:lnTo>
-                  <a:pt x="11042" y="0"/>
-                </a:lnTo>
-                <a:close/>
-              </a:path>
-            </a:pathLst>
-          </a:custGeom>
-          <a:solidFill>
-            <a:srgbClr val="000000"/>
-          </a:solidFill>
-          <a:ln w="12700">
-            <a:miter lim="400000"/>
-          </a:ln>
-          <a:effectLst/>
-        </p:spPr>
-        <p:txBody>
-          <a:bodyPr lIns="45719" rIns="45719"/>
-          <a:lstStyle/>
-          <a:p>
-            <a:pPr defTabSz="1386083" hangingPunct="0"/>
-            <a:endParaRPr sz="2729" kern="0">
-              <a:solidFill>
-                <a:srgbClr val="000000"/>
-              </a:solidFill>
-              <a:cs typeface="Calibri"/>
-              <a:sym typeface="Calibri"/>
-            </a:endParaRPr>
-          </a:p>
-        </p:txBody>
-      </p:sp>
-      <p:sp>
-        <p:nvSpPr>
-          <p:cNvPr id="51" name="object 47">
-            <a:extLst>
-              <a:ext uri="{FF2B5EF4-FFF2-40B4-BE49-F238E27FC236}">
-                <a16:creationId xmlns:a16="http://schemas.microsoft.com/office/drawing/2014/main" id="{E16D34EB-4914-3DF9-78A1-9CEF9A97F5B4}"/>
-              </a:ext>
-            </a:extLst>
-          </p:cNvPr>
-          <p:cNvSpPr/>
-          <p:nvPr/>
-        </p:nvSpPr>
-        <p:spPr>
-          <a:xfrm>
-            <a:off x="19324033" y="29183952"/>
-            <a:ext cx="1097932" cy="1017704"/>
-          </a:xfrm>
-          <a:custGeom>
-            <a:avLst/>
-            <a:gdLst/>
-            <a:ahLst/>
-            <a:cxnLst>
-              <a:cxn ang="0">
-                <a:pos x="wd2" y="hd2"/>
-              </a:cxn>
-              <a:cxn ang="5400000">
-                <a:pos x="wd2" y="hd2"/>
-              </a:cxn>
-              <a:cxn ang="10800000">
-                <a:pos x="wd2" y="hd2"/>
-              </a:cxn>
-              <a:cxn ang="16200000">
-                <a:pos x="wd2" y="hd2"/>
-              </a:cxn>
-            </a:cxnLst>
-            <a:rect l="0" t="0" r="r" b="b"/>
-            <a:pathLst>
-              <a:path w="21600" h="21600" extrusionOk="0">
-                <a:moveTo>
-                  <a:pt x="11042" y="0"/>
-                </a:moveTo>
-                <a:lnTo>
-                  <a:pt x="10804" y="0"/>
-                </a:lnTo>
-                <a:lnTo>
-                  <a:pt x="10450" y="35"/>
-                </a:lnTo>
-                <a:lnTo>
-                  <a:pt x="9358" y="697"/>
-                </a:lnTo>
-                <a:lnTo>
-                  <a:pt x="8996" y="1569"/>
-                </a:lnTo>
-                <a:lnTo>
-                  <a:pt x="8996" y="1806"/>
-                </a:lnTo>
-                <a:lnTo>
-                  <a:pt x="9526" y="3083"/>
-                </a:lnTo>
-                <a:lnTo>
-                  <a:pt x="15468" y="9000"/>
-                </a:lnTo>
-                <a:lnTo>
-                  <a:pt x="1801" y="9000"/>
-                </a:lnTo>
-                <a:lnTo>
-                  <a:pt x="527" y="9527"/>
-                </a:lnTo>
-                <a:lnTo>
-                  <a:pt x="0" y="10798"/>
-                </a:lnTo>
-                <a:lnTo>
-                  <a:pt x="35" y="11151"/>
-                </a:lnTo>
-                <a:lnTo>
-                  <a:pt x="802" y="12295"/>
-                </a:lnTo>
-                <a:lnTo>
-                  <a:pt x="1801" y="12597"/>
-                </a:lnTo>
-                <a:lnTo>
-                  <a:pt x="15468" y="12597"/>
-                </a:lnTo>
-                <a:lnTo>
-                  <a:pt x="9357" y="18681"/>
-                </a:lnTo>
-                <a:lnTo>
-                  <a:pt x="9223" y="18880"/>
-                </a:lnTo>
-                <a:lnTo>
-                  <a:pt x="9040" y="19319"/>
-                </a:lnTo>
-                <a:lnTo>
-                  <a:pt x="8993" y="19554"/>
-                </a:lnTo>
-                <a:lnTo>
-                  <a:pt x="8993" y="20028"/>
-                </a:lnTo>
-                <a:lnTo>
-                  <a:pt x="9693" y="21237"/>
-                </a:lnTo>
-                <a:lnTo>
-                  <a:pt x="10567" y="21600"/>
-                </a:lnTo>
-                <a:lnTo>
-                  <a:pt x="11042" y="21600"/>
-                </a:lnTo>
-                <a:lnTo>
-                  <a:pt x="21087" y="12075"/>
-                </a:lnTo>
-                <a:lnTo>
-                  <a:pt x="21600" y="10798"/>
-                </a:lnTo>
-                <a:lnTo>
-                  <a:pt x="21566" y="10452"/>
-                </a:lnTo>
-                <a:lnTo>
-                  <a:pt x="11915" y="361"/>
-                </a:lnTo>
-                <a:lnTo>
-                  <a:pt x="11277" y="47"/>
-                </a:lnTo>
-                <a:lnTo>
-                  <a:pt x="11042" y="0"/>
-                </a:lnTo>
-                <a:close/>
-              </a:path>
-            </a:pathLst>
-          </a:custGeom>
-          <a:solidFill>
-            <a:srgbClr val="000000"/>
-          </a:solidFill>
-          <a:ln w="12700">
-            <a:miter lim="400000"/>
-          </a:ln>
-          <a:effectLst/>
-        </p:spPr>
-        <p:txBody>
-          <a:bodyPr lIns="45719" rIns="45719"/>
-          <a:lstStyle/>
-          <a:p>
-            <a:pPr defTabSz="1386083" hangingPunct="0"/>
-            <a:endParaRPr sz="2729" kern="0">
-              <a:solidFill>
-                <a:srgbClr val="000000"/>
-              </a:solidFill>
-              <a:cs typeface="Calibri"/>
-              <a:sym typeface="Calibri"/>
-            </a:endParaRPr>
-          </a:p>
-        </p:txBody>
-      </p:sp>
-      <p:sp>
-        <p:nvSpPr>
           <p:cNvPr id="52" name="TextBox 51">
             <a:extLst>
               <a:ext uri="{FF2B5EF4-FFF2-40B4-BE49-F238E27FC236}">
@@ -5206,8 +4907,8 @@
         </p:nvSpPr>
         <p:spPr>
           <a:xfrm>
-            <a:off x="12276739" y="23166168"/>
-            <a:ext cx="4653518" cy="923329"/>
+            <a:off x="12297580" y="23166168"/>
+            <a:ext cx="4611840" cy="923329"/>
           </a:xfrm>
           <a:prstGeom prst="rect">
             <a:avLst/>
@@ -5259,7 +4960,7 @@
                 <a:cs typeface="Calibri"/>
                 <a:sym typeface="Calibri"/>
               </a:rPr>
-              <a:t>Design Process</a:t>
+              <a:t>Design Insights</a:t>
             </a:r>
           </a:p>
         </p:txBody>
@@ -5349,8 +5050,8 @@
         </p:nvSpPr>
         <p:spPr>
           <a:xfrm>
-            <a:off x="12532191" y="9760802"/>
-            <a:ext cx="4084452" cy="923329"/>
+            <a:off x="11970342" y="9760802"/>
+            <a:ext cx="5208157" cy="923329"/>
           </a:xfrm>
           <a:prstGeom prst="rect">
             <a:avLst/>
@@ -5402,7 +5103,7 @@
                 <a:cs typeface="Calibri"/>
                 <a:sym typeface="Calibri"/>
               </a:rPr>
-              <a:t>Key Features</a:t>
+              <a:t>Key Functionality</a:t>
             </a:r>
           </a:p>
         </p:txBody>
@@ -6326,8 +6027,8 @@
         </p:nvSpPr>
         <p:spPr>
           <a:xfrm>
-            <a:off x="20092533" y="4274888"/>
-            <a:ext cx="3706144" cy="923329"/>
+            <a:off x="19767126" y="4274888"/>
+            <a:ext cx="4356962" cy="923329"/>
           </a:xfrm>
           <a:prstGeom prst="rect">
             <a:avLst/>
@@ -6379,7 +6080,7 @@
                 <a:cs typeface="Calibri"/>
                 <a:sym typeface="Calibri"/>
               </a:rPr>
-              <a:t>Proposition</a:t>
+              <a:t>Our Approach</a:t>
             </a:r>
           </a:p>
         </p:txBody>

</xml_diff>